<commit_message>
Add new tests project
</commit_message>
<xml_diff>
--- a/WarsztatQA/WarsztatQA.pptx
+++ b/WarsztatQA/WarsztatQA.pptx
@@ -10776,7 +10776,7 @@
         <p:spPr/>
         <p:txBody>
           <a:bodyPr>
-            <a:normAutofit fontScale="85000" lnSpcReduction="20000"/>
+            <a:normAutofit fontScale="62500" lnSpcReduction="20000"/>
           </a:bodyPr>
           <a:lstStyle/>
           <a:p>
@@ -10814,6 +10814,29 @@
               <a:buNone/>
             </a:pPr>
             <a:r>
+              <a:rPr lang="pl-PL" b="1" dirty="0" err="1"/>
+              <a:t>java</a:t>
+            </a:r>
+            <a:r>
+              <a:rPr lang="pl-PL" b="1" dirty="0"/>
+              <a:t> –jar </a:t>
+            </a:r>
+            <a:r>
+              <a:rPr lang="pl-PL" dirty="0"/>
+              <a:t>selenium-server-standalone-2.41.0.jar</a:t>
+            </a:r>
+          </a:p>
+          <a:p>
+            <a:pPr marL="0" indent="0">
+              <a:buNone/>
+            </a:pPr>
+            <a:endParaRPr lang="pl-PL" dirty="0"/>
+          </a:p>
+          <a:p>
+            <a:pPr marL="0" indent="0">
+              <a:buNone/>
+            </a:pPr>
+            <a:r>
               <a:rPr lang="pl-PL" dirty="0"/>
               <a:t>3. Utworzenie 1 testu </a:t>
             </a:r>
@@ -10904,12 +10927,12 @@
           <a:p>
             <a:pPr lvl="1"/>
             <a:r>
-              <a:rPr lang="pl-PL">
+              <a:rPr lang="pl-PL" dirty="0">
                 <a:hlinkClick r:id="rId5"/>
               </a:rPr>
               <a:t>https://jasmine.github.io/tutorials/your_first_suite</a:t>
             </a:r>
-            <a:endParaRPr lang="pl-PL"/>
+            <a:endParaRPr lang="pl-PL" dirty="0"/>
           </a:p>
           <a:p>
             <a:pPr lvl="1"/>

</xml_diff>